<commit_message>
Subo simulacion y modifico PPT con imagenes de proyecto corregido
</commit_message>
<xml_diff>
--- a/Ejercicio #2/Wokwi/Presentacion/Estacion Meteorologica Presentacion.pptx
+++ b/Ejercicio #2/Wokwi/Presentacion/Estacion Meteorologica Presentacion.pptx
@@ -293,7 +293,7 @@
             <a:fld id="{87DE6118-2437-4B30-8E3C-4D2BE6020583}" type="datetimeFigureOut">
               <a:rPr lang="en-US" dirty="0"/>
               <a:pPr/>
-              <a:t>9/8/2023</a:t>
+              <a:t>9/14/2023</a:t>
             </a:fld>
             <a:endParaRPr lang="en-US" dirty="0"/>
           </a:p>
@@ -619,7 +619,7 @@
           <a:p>
             <a:fld id="{87DE6118-2437-4B30-8E3C-4D2BE6020583}" type="datetimeFigureOut">
               <a:rPr lang="en-US" dirty="0"/>
-              <a:t>9/8/2023</a:t>
+              <a:t>9/14/2023</a:t>
             </a:fld>
             <a:endParaRPr lang="en-US" dirty="0"/>
           </a:p>
@@ -794,7 +794,7 @@
           <a:p>
             <a:fld id="{87DE6118-2437-4B30-8E3C-4D2BE6020583}" type="datetimeFigureOut">
               <a:rPr lang="en-US" dirty="0"/>
-              <a:t>9/8/2023</a:t>
+              <a:t>9/14/2023</a:t>
             </a:fld>
             <a:endParaRPr lang="en-US" dirty="0"/>
           </a:p>
@@ -959,7 +959,7 @@
           <a:p>
             <a:fld id="{87DE6118-2437-4B30-8E3C-4D2BE6020583}" type="datetimeFigureOut">
               <a:rPr lang="en-US" dirty="0"/>
-              <a:t>9/8/2023</a:t>
+              <a:t>9/14/2023</a:t>
             </a:fld>
             <a:endParaRPr lang="en-US" dirty="0"/>
           </a:p>
@@ -1232,7 +1232,7 @@
             <a:fld id="{87DE6118-2437-4B30-8E3C-4D2BE6020583}" type="datetimeFigureOut">
               <a:rPr lang="en-US" dirty="0"/>
               <a:pPr/>
-              <a:t>9/8/2023</a:t>
+              <a:t>9/14/2023</a:t>
             </a:fld>
             <a:endParaRPr lang="en-US" dirty="0"/>
           </a:p>
@@ -1622,7 +1622,7 @@
           <a:p>
             <a:fld id="{87DE6118-2437-4B30-8E3C-4D2BE6020583}" type="datetimeFigureOut">
               <a:rPr lang="en-US" dirty="0"/>
-              <a:t>9/8/2023</a:t>
+              <a:t>9/14/2023</a:t>
             </a:fld>
             <a:endParaRPr lang="en-US" dirty="0"/>
           </a:p>
@@ -2094,7 +2094,7 @@
           <a:p>
             <a:fld id="{87DE6118-2437-4B30-8E3C-4D2BE6020583}" type="datetimeFigureOut">
               <a:rPr lang="en-US" dirty="0"/>
-              <a:t>9/8/2023</a:t>
+              <a:t>9/14/2023</a:t>
             </a:fld>
             <a:endParaRPr lang="en-US" dirty="0"/>
           </a:p>
@@ -2207,7 +2207,7 @@
           <a:p>
             <a:fld id="{87DE6118-2437-4B30-8E3C-4D2BE6020583}" type="datetimeFigureOut">
               <a:rPr lang="en-US" dirty="0"/>
-              <a:t>9/8/2023</a:t>
+              <a:t>9/14/2023</a:t>
             </a:fld>
             <a:endParaRPr lang="en-US" dirty="0"/>
           </a:p>
@@ -2297,7 +2297,7 @@
           <a:p>
             <a:fld id="{87DE6118-2437-4B30-8E3C-4D2BE6020583}" type="datetimeFigureOut">
               <a:rPr lang="en-US" dirty="0"/>
-              <a:t>9/8/2023</a:t>
+              <a:t>9/14/2023</a:t>
             </a:fld>
             <a:endParaRPr lang="en-US" dirty="0"/>
           </a:p>
@@ -2639,7 +2639,7 @@
             <a:fld id="{87DE6118-2437-4B30-8E3C-4D2BE6020583}" type="datetimeFigureOut">
               <a:rPr lang="en-US" dirty="0"/>
               <a:pPr/>
-              <a:t>9/8/2023</a:t>
+              <a:t>9/14/2023</a:t>
             </a:fld>
             <a:endParaRPr lang="en-US" dirty="0"/>
           </a:p>
@@ -3024,7 +3024,7 @@
             <a:fld id="{87DE6118-2437-4B30-8E3C-4D2BE6020583}" type="datetimeFigureOut">
               <a:rPr lang="en-US" dirty="0"/>
               <a:pPr/>
-              <a:t>9/8/2023</a:t>
+              <a:t>9/14/2023</a:t>
             </a:fld>
             <a:endParaRPr lang="en-US" dirty="0"/>
           </a:p>
@@ -3299,7 +3299,7 @@
             <a:fld id="{87DE6118-2437-4B30-8E3C-4D2BE6020583}" type="datetimeFigureOut">
               <a:rPr lang="en-US" dirty="0"/>
               <a:pPr/>
-              <a:t>9/8/2023</a:t>
+              <a:t>9/14/2023</a:t>
             </a:fld>
             <a:endParaRPr lang="en-US" dirty="0"/>
           </a:p>
@@ -3862,13 +3862,8 @@
           <a:p>
             <a:r>
               <a:rPr lang="es-ES" dirty="0" smtClean="0"/>
-              <a:t>Instituto Superior Politécnico de </a:t>
-            </a:r>
-            <a:r>
-              <a:rPr lang="es-ES" dirty="0" smtClean="0"/>
-              <a:t>Córdoba</a:t>
-            </a:r>
-            <a:endParaRPr lang="es-ES" dirty="0" smtClean="0"/>
+              <a:t>Instituto Superior Politécnico de Córdoba</a:t>
+            </a:r>
           </a:p>
           <a:p>
             <a:r>
@@ -4120,7 +4115,7 @@
       </p:sp>
       <p:pic>
         <p:nvPicPr>
-          <p:cNvPr id="4" name="Imagen 3"/>
+          <p:cNvPr id="5" name="Imagen 4"/>
           <p:cNvPicPr>
             <a:picLocks noChangeAspect="1"/>
           </p:cNvPicPr>
@@ -4140,8 +4135,8 @@
         </p:blipFill>
         <p:spPr>
           <a:xfrm>
-            <a:off x="1695450" y="4034002"/>
-            <a:ext cx="8953500" cy="1943100"/>
+            <a:off x="1758492" y="3995244"/>
+            <a:ext cx="9214308" cy="1932589"/>
           </a:xfrm>
           <a:prstGeom prst="rect">
             <a:avLst/>
@@ -5584,7 +5579,7 @@
       </p:sp>
       <p:pic>
         <p:nvPicPr>
-          <p:cNvPr id="4" name="Marcador de contenido 3"/>
+          <p:cNvPr id="5" name="Marcador de contenido 4"/>
           <p:cNvPicPr>
             <a:picLocks noGrp="1" noChangeAspect="1"/>
           </p:cNvPicPr>
@@ -5606,8 +5601,8 @@
         </p:blipFill>
         <p:spPr>
           <a:xfrm>
-            <a:off x="1833989" y="1644868"/>
-            <a:ext cx="9327997" cy="4863741"/>
+            <a:off x="2639068" y="1397876"/>
+            <a:ext cx="7066263" cy="5139559"/>
           </a:xfrm>
         </p:spPr>
       </p:pic>

</xml_diff>